<commit_message>
instruction for installing anaconda on your system
</commit_message>
<xml_diff>
--- a/how_to_install_anaconda.pptx
+++ b/how_to_install_anaconda.pptx
@@ -3433,6 +3433,13 @@
   <p:clrMapOvr>
     <a:masterClrMapping/>
   </p:clrMapOvr>
+  <p:timing>
+    <p:tnLst>
+      <p:par>
+        <p:cTn id="1" dur="indefinite" restart="never" nodeType="tmRoot"/>
+      </p:par>
+    </p:tnLst>
+  </p:timing>
 </p:sld>
 </file>
 
@@ -3509,11 +3516,7 @@
             </a:r>
             <a:r>
               <a:rPr lang="en-US" dirty="0" smtClean="0"/>
-              <a:t>‘</a:t>
-            </a:r>
-            <a:r>
-              <a:rPr lang="en-US" smtClean="0"/>
-              <a:t>numerical’ computing</a:t>
+              <a:t>‘numerical’ computing</a:t>
             </a:r>
             <a:endParaRPr lang="en-US" dirty="0"/>
           </a:p>
@@ -3529,6 +3532,13 @@
   <p:clrMapOvr>
     <a:masterClrMapping/>
   </p:clrMapOvr>
+  <p:timing>
+    <p:tnLst>
+      <p:par>
+        <p:cTn id="1" dur="indefinite" restart="never" nodeType="tmRoot"/>
+      </p:par>
+    </p:tnLst>
+  </p:timing>
 </p:sld>
 </file>
 
@@ -3654,6 +3664,13 @@
   <p:clrMapOvr>
     <a:masterClrMapping/>
   </p:clrMapOvr>
+  <p:timing>
+    <p:tnLst>
+      <p:par>
+        <p:cTn id="1" dur="indefinite" restart="never" nodeType="tmRoot"/>
+      </p:par>
+    </p:tnLst>
+  </p:timing>
 </p:sld>
 </file>
 
@@ -3766,6 +3783,13 @@
   <p:clrMapOvr>
     <a:masterClrMapping/>
   </p:clrMapOvr>
+  <p:timing>
+    <p:tnLst>
+      <p:par>
+        <p:cTn id="1" dur="indefinite" restart="never" nodeType="tmRoot"/>
+      </p:par>
+    </p:tnLst>
+  </p:timing>
 </p:sld>
 </file>
 
@@ -3907,6 +3931,13 @@
   <p:clrMapOvr>
     <a:masterClrMapping/>
   </p:clrMapOvr>
+  <p:timing>
+    <p:tnLst>
+      <p:par>
+        <p:cTn id="1" dur="indefinite" restart="never" nodeType="tmRoot"/>
+      </p:par>
+    </p:tnLst>
+  </p:timing>
 </p:sld>
 </file>
 
@@ -4041,6 +4072,13 @@
   <p:clrMapOvr>
     <a:masterClrMapping/>
   </p:clrMapOvr>
+  <p:timing>
+    <p:tnLst>
+      <p:par>
+        <p:cTn id="1" dur="indefinite" restart="never" nodeType="tmRoot"/>
+      </p:par>
+    </p:tnLst>
+  </p:timing>
 </p:sld>
 </file>
 
@@ -4178,6 +4216,13 @@
   <p:clrMapOvr>
     <a:masterClrMapping/>
   </p:clrMapOvr>
+  <p:timing>
+    <p:tnLst>
+      <p:par>
+        <p:cTn id="1" dur="indefinite" restart="never" nodeType="tmRoot"/>
+      </p:par>
+    </p:tnLst>
+  </p:timing>
 </p:sld>
 </file>
 

</xml_diff>